<commit_message>
Description diagrammes de séquencess
</commit_message>
<xml_diff>
--- a/Rendu/Diaporama.pptx
+++ b/Rendu/Diaporama.pptx
@@ -21821,20 +21821,20 @@
 </file>
 
 <file path=customXml/item2.xml><?xml version="1.0" encoding="utf-8"?>
+<p:properties xmlns:p="http://schemas.microsoft.com/office/2006/metadata/properties" xmlns:xsi="http://www.w3.org/2001/XMLSchema-instance" xmlns:pc="http://schemas.microsoft.com/office/infopath/2007/PartnerControls">
+  <documentManagement>
+    <MediaServiceKeyPoints xmlns="71af3243-3dd4-4a8d-8c0d-dd76da1f02a5" xsi:nil="true"/>
+  </documentManagement>
+</p:properties>
+</file>
+
+<file path=customXml/item3.xml><?xml version="1.0" encoding="utf-8"?>
 <?mso-contentType ?>
 <FormTemplates xmlns="http://schemas.microsoft.com/sharepoint/v3/contenttype/forms">
   <Display>DocumentLibraryForm</Display>
   <Edit>DocumentLibraryForm</Edit>
   <New>DocumentLibraryForm</New>
 </FormTemplates>
-</file>
-
-<file path=customXml/item3.xml><?xml version="1.0" encoding="utf-8"?>
-<p:properties xmlns:p="http://schemas.microsoft.com/office/2006/metadata/properties" xmlns:xsi="http://www.w3.org/2001/XMLSchema-instance" xmlns:pc="http://schemas.microsoft.com/office/infopath/2007/PartnerControls">
-  <documentManagement>
-    <MediaServiceKeyPoints xmlns="71af3243-3dd4-4a8d-8c0d-dd76da1f02a5" xsi:nil="true"/>
-  </documentManagement>
-</p:properties>
 </file>
 
 <file path=customXml/itemProps1.xml><?xml version="1.0" encoding="utf-8"?>
@@ -21857,14 +21857,6 @@
 </file>
 
 <file path=customXml/itemProps2.xml><?xml version="1.0" encoding="utf-8"?>
-<ds:datastoreItem xmlns:ds="http://schemas.openxmlformats.org/officeDocument/2006/customXml" ds:itemID="{0C66BDC7-24D2-4343-8D41-18F9C23F860A}">
-  <ds:schemaRefs>
-    <ds:schemaRef ds:uri="http://schemas.microsoft.com/sharepoint/v3/contenttype/forms"/>
-  </ds:schemaRefs>
-</ds:datastoreItem>
-</file>
-
-<file path=customXml/itemProps3.xml><?xml version="1.0" encoding="utf-8"?>
 <ds:datastoreItem xmlns:ds="http://schemas.openxmlformats.org/officeDocument/2006/customXml" ds:itemID="{AF4BDB64-2AF8-42D4-96C8-B6B6F098993C}">
   <ds:schemaRefs>
     <ds:schemaRef ds:uri="http://schemas.microsoft.com/office/2006/metadata/properties"/>
@@ -21872,4 +21864,12 @@
     <ds:schemaRef ds:uri="71af3243-3dd4-4a8d-8c0d-dd76da1f02a5"/>
   </ds:schemaRefs>
 </ds:datastoreItem>
+</file>
+
+<file path=customXml/itemProps3.xml><?xml version="1.0" encoding="utf-8"?>
+<ds:datastoreItem xmlns:ds="http://schemas.openxmlformats.org/officeDocument/2006/customXml" ds:itemID="{0C66BDC7-24D2-4343-8D41-18F9C23F860A}">
+  <ds:schemaRefs>
+    <ds:schemaRef ds:uri="http://schemas.microsoft.com/sharepoint/v3/contenttype/forms"/>
+  </ds:schemaRefs>
+</ds:datastoreItem>
 </file>
</xml_diff>

<commit_message>
Ajout photos + correction entêtes rapport
</commit_message>
<xml_diff>
--- a/Rendu/Diaporama.pptx
+++ b/Rendu/Diaporama.pptx
@@ -14757,7 +14757,7 @@
       </p:sp>
       <p:pic>
         <p:nvPicPr>
-          <p:cNvPr id="24" name="Espace réservé d’image 23" descr="Photo de profil d’une femme">
+          <p:cNvPr id="24" name="Espace réservé d’image 23">
             <a:extLst>
               <a:ext uri="{FF2B5EF4-FFF2-40B4-BE49-F238E27FC236}">
                 <a16:creationId xmlns:a16="http://schemas.microsoft.com/office/drawing/2014/main" id="{91E4C46E-2FA2-4AD2-A502-41A01ADDB2A8}"/>
@@ -14771,12 +14771,11 @@
             <p:ph type="pic" sz="quarter" idx="23"/>
           </p:nvPr>
         </p:nvPicPr>
-        <p:blipFill rotWithShape="1">
-          <a:blip r:embed="rId3" cstate="screen">
-            <a:grayscl/>
+        <p:blipFill>
+          <a:blip r:embed="rId3">
             <a:extLst>
               <a:ext uri="{28A0092B-C50C-407E-A947-70E740481C1C}">
-                <a14:useLocalDpi xmlns:a14="http://schemas.microsoft.com/office/drawing/2010/main"/>
+                <a14:useLocalDpi xmlns:a14="http://schemas.microsoft.com/office/drawing/2010/main" val="0"/>
               </a:ext>
             </a:extLst>
           </a:blip>
@@ -14883,7 +14882,7 @@
       </p:sp>
       <p:pic>
         <p:nvPicPr>
-          <p:cNvPr id="26" name="Espace réservé d’image 25" descr="Photo de profil d’un homme">
+          <p:cNvPr id="26" name="Espace réservé d’image 25">
             <a:extLst>
               <a:ext uri="{FF2B5EF4-FFF2-40B4-BE49-F238E27FC236}">
                 <a16:creationId xmlns:a16="http://schemas.microsoft.com/office/drawing/2014/main" id="{BAC2E32D-D8C5-439B-A150-5D05F5743F70}"/>
@@ -14898,11 +14897,10 @@
           </p:nvPr>
         </p:nvPicPr>
         <p:blipFill rotWithShape="1">
-          <a:blip r:embed="rId5" cstate="screen">
-            <a:grayscl/>
+          <a:blip r:embed="rId5">
             <a:extLst>
               <a:ext uri="{28A0092B-C50C-407E-A947-70E740481C1C}">
-                <a14:useLocalDpi xmlns:a14="http://schemas.microsoft.com/office/drawing/2010/main"/>
+                <a14:useLocalDpi xmlns:a14="http://schemas.microsoft.com/office/drawing/2010/main" val="0"/>
               </a:ext>
             </a:extLst>
           </a:blip>
@@ -14911,7 +14909,7 @@
         </p:blipFill>
         <p:spPr>
           <a:xfrm>
-            <a:off x="5642848" y="1648853"/>
+            <a:off x="5642952" y="1635428"/>
             <a:ext cx="906304" cy="1206290"/>
           </a:xfrm>
         </p:spPr>
@@ -21821,20 +21819,20 @@
 </file>
 
 <file path=customXml/item2.xml><?xml version="1.0" encoding="utf-8"?>
-<p:properties xmlns:p="http://schemas.microsoft.com/office/2006/metadata/properties" xmlns:xsi="http://www.w3.org/2001/XMLSchema-instance" xmlns:pc="http://schemas.microsoft.com/office/infopath/2007/PartnerControls">
-  <documentManagement>
-    <MediaServiceKeyPoints xmlns="71af3243-3dd4-4a8d-8c0d-dd76da1f02a5" xsi:nil="true"/>
-  </documentManagement>
-</p:properties>
-</file>
-
-<file path=customXml/item3.xml><?xml version="1.0" encoding="utf-8"?>
 <?mso-contentType ?>
 <FormTemplates xmlns="http://schemas.microsoft.com/sharepoint/v3/contenttype/forms">
   <Display>DocumentLibraryForm</Display>
   <Edit>DocumentLibraryForm</Edit>
   <New>DocumentLibraryForm</New>
 </FormTemplates>
+</file>
+
+<file path=customXml/item3.xml><?xml version="1.0" encoding="utf-8"?>
+<p:properties xmlns:p="http://schemas.microsoft.com/office/2006/metadata/properties" xmlns:xsi="http://www.w3.org/2001/XMLSchema-instance" xmlns:pc="http://schemas.microsoft.com/office/infopath/2007/PartnerControls">
+  <documentManagement>
+    <MediaServiceKeyPoints xmlns="71af3243-3dd4-4a8d-8c0d-dd76da1f02a5" xsi:nil="true"/>
+  </documentManagement>
+</p:properties>
 </file>
 
 <file path=customXml/itemProps1.xml><?xml version="1.0" encoding="utf-8"?>
@@ -21857,6 +21855,14 @@
 </file>
 
 <file path=customXml/itemProps2.xml><?xml version="1.0" encoding="utf-8"?>
+<ds:datastoreItem xmlns:ds="http://schemas.openxmlformats.org/officeDocument/2006/customXml" ds:itemID="{0C66BDC7-24D2-4343-8D41-18F9C23F860A}">
+  <ds:schemaRefs>
+    <ds:schemaRef ds:uri="http://schemas.microsoft.com/sharepoint/v3/contenttype/forms"/>
+  </ds:schemaRefs>
+</ds:datastoreItem>
+</file>
+
+<file path=customXml/itemProps3.xml><?xml version="1.0" encoding="utf-8"?>
 <ds:datastoreItem xmlns:ds="http://schemas.openxmlformats.org/officeDocument/2006/customXml" ds:itemID="{AF4BDB64-2AF8-42D4-96C8-B6B6F098993C}">
   <ds:schemaRefs>
     <ds:schemaRef ds:uri="http://schemas.microsoft.com/office/2006/metadata/properties"/>
@@ -21864,12 +21870,4 @@
     <ds:schemaRef ds:uri="71af3243-3dd4-4a8d-8c0d-dd76da1f02a5"/>
   </ds:schemaRefs>
 </ds:datastoreItem>
-</file>
-
-<file path=customXml/itemProps3.xml><?xml version="1.0" encoding="utf-8"?>
-<ds:datastoreItem xmlns:ds="http://schemas.openxmlformats.org/officeDocument/2006/customXml" ds:itemID="{0C66BDC7-24D2-4343-8D41-18F9C23F860A}">
-  <ds:schemaRefs>
-    <ds:schemaRef ds:uri="http://schemas.microsoft.com/sharepoint/v3/contenttype/forms"/>
-  </ds:schemaRefs>
-</ds:datastoreItem>
 </file>
</xml_diff>

<commit_message>
Ajout transitions page diapo
</commit_message>
<xml_diff>
--- a/Rendu/Diaporama.pptx
+++ b/Rendu/Diaporama.pptx
@@ -217,7 +217,7 @@
           <a:p>
             <a:fld id="{DE2FD365-8FC1-4D01-A948-217AAD7A8313}" type="datetime1">
               <a:rPr lang="fr-FR" smtClean="0"/>
-              <a:t>17/05/2021</a:t>
+              <a:t>18/05/2021</a:t>
             </a:fld>
             <a:endParaRPr lang="fr-FR" dirty="0"/>
           </a:p>
@@ -385,7 +385,7 @@
             <a:pPr rtl="0"/>
             <a:fld id="{1385894B-BD9A-4ED9-A73F-5EFC8D57D3CB}" type="datetime1">
               <a:rPr lang="fr-FR" noProof="0" smtClean="0"/>
-              <a:t>17/05/2021</a:t>
+              <a:t>18/05/2021</a:t>
             </a:fld>
             <a:endParaRPr lang="fr-FR" noProof="0" dirty="0"/>
           </a:p>
@@ -12927,6 +12927,9 @@
   <p:clrMapOvr>
     <a:masterClrMapping/>
   </p:clrMapOvr>
+  <p:transition spd="slow">
+    <p:wipe/>
+  </p:transition>
 </p:sld>
 </file>
 
@@ -13378,6 +13381,18 @@
   <p:clrMapOvr>
     <a:masterClrMapping/>
   </p:clrMapOvr>
+  <mc:AlternateContent xmlns:mc="http://schemas.openxmlformats.org/markup-compatibility/2006">
+    <mc:Choice xmlns:p14="http://schemas.microsoft.com/office/powerpoint/2010/main" Requires="p14">
+      <p:transition spd="med" p14:dur="700">
+        <p:fade/>
+      </p:transition>
+    </mc:Choice>
+    <mc:Fallback>
+      <p:transition spd="med">
+        <p:fade/>
+      </p:transition>
+    </mc:Fallback>
+  </mc:AlternateContent>
 </p:sld>
 </file>
 
@@ -13829,6 +13844,18 @@
   <p:clrMapOvr>
     <a:masterClrMapping/>
   </p:clrMapOvr>
+  <mc:AlternateContent xmlns:mc="http://schemas.openxmlformats.org/markup-compatibility/2006">
+    <mc:Choice xmlns:p14="http://schemas.microsoft.com/office/powerpoint/2010/main" Requires="p14">
+      <p:transition spd="med" p14:dur="700">
+        <p:fade/>
+      </p:transition>
+    </mc:Choice>
+    <mc:Fallback>
+      <p:transition spd="med">
+        <p:fade/>
+      </p:transition>
+    </mc:Fallback>
+  </mc:AlternateContent>
 </p:sld>
 </file>
 
@@ -14045,6 +14072,18 @@
   <p:clrMapOvr>
     <a:masterClrMapping/>
   </p:clrMapOvr>
+  <mc:AlternateContent xmlns:mc="http://schemas.openxmlformats.org/markup-compatibility/2006">
+    <mc:Choice xmlns:p14="http://schemas.microsoft.com/office/powerpoint/2010/main" Requires="p14">
+      <p:transition spd="med" p14:dur="700">
+        <p:fade/>
+      </p:transition>
+    </mc:Choice>
+    <mc:Fallback>
+      <p:transition spd="med">
+        <p:fade/>
+      </p:transition>
+    </mc:Fallback>
+  </mc:AlternateContent>
 </p:sld>
 </file>
 
@@ -14261,6 +14300,18 @@
   <p:clrMapOvr>
     <a:masterClrMapping/>
   </p:clrMapOvr>
+  <mc:AlternateContent xmlns:mc="http://schemas.openxmlformats.org/markup-compatibility/2006">
+    <mc:Choice xmlns:p14="http://schemas.microsoft.com/office/powerpoint/2010/main" Requires="p14">
+      <p:transition spd="med" p14:dur="700">
+        <p:fade/>
+      </p:transition>
+    </mc:Choice>
+    <mc:Fallback>
+      <p:transition spd="med">
+        <p:fade/>
+      </p:transition>
+    </mc:Fallback>
+  </mc:AlternateContent>
 </p:sld>
 </file>
 
@@ -14924,6 +14975,9 @@
   <p:clrMapOvr>
     <a:masterClrMapping/>
   </p:clrMapOvr>
+  <p:transition spd="slow">
+    <p:cover/>
+  </p:transition>
 </p:sld>
 </file>
 
@@ -15393,6 +15447,18 @@
   <p:clrMapOvr>
     <a:masterClrMapping/>
   </p:clrMapOvr>
+  <mc:AlternateContent xmlns:mc="http://schemas.openxmlformats.org/markup-compatibility/2006">
+    <mc:Choice xmlns:p15="http://schemas.microsoft.com/office/powerpoint/2012/main" Requires="p15">
+      <p:transition xmlns:p14="http://schemas.microsoft.com/office/powerpoint/2010/main" spd="slow" p14:dur="2000">
+        <p15:prstTrans prst="fallOver"/>
+      </p:transition>
+    </mc:Choice>
+    <mc:Fallback>
+      <p:transition spd="slow">
+        <p:fade/>
+      </p:transition>
+    </mc:Fallback>
+  </mc:AlternateContent>
 </p:sld>
 </file>
 
@@ -16587,6 +16653,18 @@
   <p:clrMapOvr>
     <a:masterClrMapping/>
   </p:clrMapOvr>
+  <mc:AlternateContent xmlns:mc="http://schemas.openxmlformats.org/markup-compatibility/2006">
+    <mc:Choice xmlns:p14="http://schemas.microsoft.com/office/powerpoint/2010/main" Requires="p14">
+      <p:transition spd="slow" p14:dur="3400">
+        <p14:reveal/>
+      </p:transition>
+    </mc:Choice>
+    <mc:Fallback>
+      <p:transition spd="slow">
+        <p:fade/>
+      </p:transition>
+    </mc:Fallback>
+  </mc:AlternateContent>
 </p:sld>
 </file>
 
@@ -18027,6 +18105,18 @@
   <p:clrMapOvr>
     <a:masterClrMapping/>
   </p:clrMapOvr>
+  <mc:AlternateContent xmlns:mc="http://schemas.openxmlformats.org/markup-compatibility/2006">
+    <mc:Choice xmlns:p14="http://schemas.microsoft.com/office/powerpoint/2010/main" Requires="p14">
+      <p:transition spd="med" p14:dur="700">
+        <p:fade/>
+      </p:transition>
+    </mc:Choice>
+    <mc:Fallback>
+      <p:transition spd="med">
+        <p:fade/>
+      </p:transition>
+    </mc:Fallback>
+  </mc:AlternateContent>
 </p:sld>
 </file>
 
@@ -19009,6 +19099,18 @@
   <p:clrMapOvr>
     <a:masterClrMapping/>
   </p:clrMapOvr>
+  <mc:AlternateContent xmlns:mc="http://schemas.openxmlformats.org/markup-compatibility/2006">
+    <mc:Choice xmlns:p14="http://schemas.microsoft.com/office/powerpoint/2010/main" Requires="p14">
+      <p:transition spd="med" p14:dur="700">
+        <p:fade/>
+      </p:transition>
+    </mc:Choice>
+    <mc:Fallback>
+      <p:transition spd="med">
+        <p:fade/>
+      </p:transition>
+    </mc:Fallback>
+  </mc:AlternateContent>
 </p:sld>
 </file>
 
@@ -19231,6 +19333,18 @@
   <p:clrMapOvr>
     <a:masterClrMapping/>
   </p:clrMapOvr>
+  <mc:AlternateContent xmlns:mc="http://schemas.openxmlformats.org/markup-compatibility/2006">
+    <mc:Choice xmlns:p14="http://schemas.microsoft.com/office/powerpoint/2010/main" Requires="p14">
+      <p:transition spd="med" p14:dur="700">
+        <p:fade/>
+      </p:transition>
+    </mc:Choice>
+    <mc:Fallback>
+      <p:transition spd="med">
+        <p:fade/>
+      </p:transition>
+    </mc:Fallback>
+  </mc:AlternateContent>
 </p:sld>
 </file>
 
@@ -19453,6 +19567,18 @@
   <p:clrMapOvr>
     <a:masterClrMapping/>
   </p:clrMapOvr>
+  <mc:AlternateContent xmlns:mc="http://schemas.openxmlformats.org/markup-compatibility/2006">
+    <mc:Choice xmlns:p14="http://schemas.microsoft.com/office/powerpoint/2010/main" Requires="p14">
+      <p:transition spd="med" p14:dur="700">
+        <p:fade/>
+      </p:transition>
+    </mc:Choice>
+    <mc:Fallback>
+      <p:transition spd="med">
+        <p:fade/>
+      </p:transition>
+    </mc:Fallback>
+  </mc:AlternateContent>
 </p:sld>
 </file>
 
@@ -19904,6 +20030,18 @@
   <p:clrMapOvr>
     <a:masterClrMapping/>
   </p:clrMapOvr>
+  <mc:AlternateContent xmlns:mc="http://schemas.openxmlformats.org/markup-compatibility/2006">
+    <mc:Choice xmlns:p14="http://schemas.microsoft.com/office/powerpoint/2010/main" Requires="p14">
+      <p:transition spd="med" p14:dur="700">
+        <p:fade/>
+      </p:transition>
+    </mc:Choice>
+    <mc:Fallback>
+      <p:transition spd="med">
+        <p:fade/>
+      </p:transition>
+    </mc:Fallback>
+  </mc:AlternateContent>
 </p:sld>
 </file>
 
@@ -20355,6 +20493,18 @@
   <p:clrMapOvr>
     <a:masterClrMapping/>
   </p:clrMapOvr>
+  <mc:AlternateContent xmlns:mc="http://schemas.openxmlformats.org/markup-compatibility/2006">
+    <mc:Choice xmlns:p14="http://schemas.microsoft.com/office/powerpoint/2010/main" Requires="p14">
+      <p:transition spd="med" p14:dur="700">
+        <p:fade/>
+      </p:transition>
+    </mc:Choice>
+    <mc:Fallback>
+      <p:transition spd="med">
+        <p:fade/>
+      </p:transition>
+    </mc:Fallback>
+  </mc:AlternateContent>
 </p:sld>
 </file>
 
@@ -20806,6 +20956,18 @@
   <p:clrMapOvr>
     <a:masterClrMapping/>
   </p:clrMapOvr>
+  <mc:AlternateContent xmlns:mc="http://schemas.openxmlformats.org/markup-compatibility/2006">
+    <mc:Choice xmlns:p14="http://schemas.microsoft.com/office/powerpoint/2010/main" Requires="p14">
+      <p:transition spd="med" p14:dur="700">
+        <p:fade/>
+      </p:transition>
+    </mc:Choice>
+    <mc:Fallback>
+      <p:transition spd="med">
+        <p:fade/>
+      </p:transition>
+    </mc:Fallback>
+  </mc:AlternateContent>
 </p:sld>
 </file>
 
@@ -21819,20 +21981,20 @@
 </file>
 
 <file path=customXml/item2.xml><?xml version="1.0" encoding="utf-8"?>
+<p:properties xmlns:p="http://schemas.microsoft.com/office/2006/metadata/properties" xmlns:xsi="http://www.w3.org/2001/XMLSchema-instance" xmlns:pc="http://schemas.microsoft.com/office/infopath/2007/PartnerControls">
+  <documentManagement>
+    <MediaServiceKeyPoints xmlns="71af3243-3dd4-4a8d-8c0d-dd76da1f02a5" xsi:nil="true"/>
+  </documentManagement>
+</p:properties>
+</file>
+
+<file path=customXml/item3.xml><?xml version="1.0" encoding="utf-8"?>
 <?mso-contentType ?>
 <FormTemplates xmlns="http://schemas.microsoft.com/sharepoint/v3/contenttype/forms">
   <Display>DocumentLibraryForm</Display>
   <Edit>DocumentLibraryForm</Edit>
   <New>DocumentLibraryForm</New>
 </FormTemplates>
-</file>
-
-<file path=customXml/item3.xml><?xml version="1.0" encoding="utf-8"?>
-<p:properties xmlns:p="http://schemas.microsoft.com/office/2006/metadata/properties" xmlns:xsi="http://www.w3.org/2001/XMLSchema-instance" xmlns:pc="http://schemas.microsoft.com/office/infopath/2007/PartnerControls">
-  <documentManagement>
-    <MediaServiceKeyPoints xmlns="71af3243-3dd4-4a8d-8c0d-dd76da1f02a5" xsi:nil="true"/>
-  </documentManagement>
-</p:properties>
 </file>
 
 <file path=customXml/itemProps1.xml><?xml version="1.0" encoding="utf-8"?>
@@ -21855,14 +22017,6 @@
 </file>
 
 <file path=customXml/itemProps2.xml><?xml version="1.0" encoding="utf-8"?>
-<ds:datastoreItem xmlns:ds="http://schemas.openxmlformats.org/officeDocument/2006/customXml" ds:itemID="{0C66BDC7-24D2-4343-8D41-18F9C23F860A}">
-  <ds:schemaRefs>
-    <ds:schemaRef ds:uri="http://schemas.microsoft.com/sharepoint/v3/contenttype/forms"/>
-  </ds:schemaRefs>
-</ds:datastoreItem>
-</file>
-
-<file path=customXml/itemProps3.xml><?xml version="1.0" encoding="utf-8"?>
 <ds:datastoreItem xmlns:ds="http://schemas.openxmlformats.org/officeDocument/2006/customXml" ds:itemID="{AF4BDB64-2AF8-42D4-96C8-B6B6F098993C}">
   <ds:schemaRefs>
     <ds:schemaRef ds:uri="http://schemas.microsoft.com/office/2006/metadata/properties"/>
@@ -21870,4 +22024,12 @@
     <ds:schemaRef ds:uri="71af3243-3dd4-4a8d-8c0d-dd76da1f02a5"/>
   </ds:schemaRefs>
 </ds:datastoreItem>
+</file>
+
+<file path=customXml/itemProps3.xml><?xml version="1.0" encoding="utf-8"?>
+<ds:datastoreItem xmlns:ds="http://schemas.openxmlformats.org/officeDocument/2006/customXml" ds:itemID="{0C66BDC7-24D2-4343-8D41-18F9C23F860A}">
+  <ds:schemaRefs>
+    <ds:schemaRef ds:uri="http://schemas.microsoft.com/sharepoint/v3/contenttype/forms"/>
+  </ds:schemaRefs>
+</ds:datastoreItem>
 </file>
</xml_diff>